<commit_message>
foward: update presentation's slide.
</commit_message>
<xml_diff>
--- a/Apresentação.pptx
+++ b/Apresentação.pptx
@@ -110,6 +110,11 @@
       </a:defRPr>
     </a:lvl9pPr>
   </p:defaultTextStyle>
+  <p:extLst>
+    <p:ext uri="{EFAFB233-063F-42B5-8137-9DF3F51BA10A}">
+      <p15:sldGuideLst xmlns:p15="http://schemas.microsoft.com/office/powerpoint/2012/main"/>
+    </p:ext>
+  </p:extLst>
 </p:presentation>
 </file>
 
@@ -4910,6 +4915,9 @@
               </a:rPr>
               <a:t>Modelos da aplicação: </a:t>
             </a:r>
+            <a:r>
+              <a:t/>
+            </a:r>
             <a:br/>
             <a:r>
               <a:rPr lang="en-US" sz="7200" b="0" strike="noStrike" spc="-1">
@@ -5176,13 +5184,7 @@
       </p:sp>
       <p:pic>
         <p:nvPicPr>
-          <p:cNvPr id="3" name="Imagem 2" descr="Uma imagem contendo texto, mapa&#10;&#10;Descrição gerada automaticamente">
-            <a:extLst>
-              <a:ext uri="{FF2B5EF4-FFF2-40B4-BE49-F238E27FC236}">
-                <a16:creationId xmlns:a16="http://schemas.microsoft.com/office/drawing/2014/main" id="{5E246992-E454-4B6F-9F05-ED2C2511F51C}"/>
-              </a:ext>
-            </a:extLst>
-          </p:cNvPr>
+          <p:cNvPr id="2" name="Imagem 1"/>
           <p:cNvPicPr>
             <a:picLocks noChangeAspect="1"/>
           </p:cNvPicPr>
@@ -5202,8 +5204,8 @@
         </p:blipFill>
         <p:spPr>
           <a:xfrm>
-            <a:off x="2544626" y="1294227"/>
-            <a:ext cx="7102748" cy="5296486"/>
+            <a:off x="1321155" y="1344058"/>
+            <a:ext cx="6456753" cy="4764795"/>
           </a:xfrm>
           <a:prstGeom prst="rect">
             <a:avLst/>
@@ -5285,13 +5287,7 @@
       </p:sp>
       <p:pic>
         <p:nvPicPr>
-          <p:cNvPr id="3" name="Imagem 2" descr="Uma imagem contendo captura de tela, texto&#10;&#10;Descrição gerada automaticamente">
-            <a:extLst>
-              <a:ext uri="{FF2B5EF4-FFF2-40B4-BE49-F238E27FC236}">
-                <a16:creationId xmlns:a16="http://schemas.microsoft.com/office/drawing/2014/main" id="{BA3A863E-4046-41C1-8B66-08F52030B1A4}"/>
-              </a:ext>
-            </a:extLst>
-          </p:cNvPr>
+          <p:cNvPr id="2" name="Imagem 1"/>
           <p:cNvPicPr>
             <a:picLocks noChangeAspect="1"/>
           </p:cNvPicPr>
@@ -5311,8 +5307,8 @@
         </p:blipFill>
         <p:spPr>
           <a:xfrm>
-            <a:off x="2395317" y="1304259"/>
-            <a:ext cx="7401366" cy="5314592"/>
+            <a:off x="1261828" y="1333040"/>
+            <a:ext cx="6800503" cy="5018183"/>
           </a:xfrm>
           <a:prstGeom prst="rect">
             <a:avLst/>

</xml_diff>